<commit_message>
Added slide explaining elif using multiple choice tests
</commit_message>
<xml_diff>
--- a/Lesson 1/Hear Me Code - Strings and Conditionals.pptx
+++ b/Lesson 1/Hear Me Code - Strings and Conditionals.pptx
@@ -63,6 +63,7 @@
     <p:sldId id="308" r:id="rId60"/>
     <p:sldId id="309" r:id="rId61"/>
     <p:sldId id="310" r:id="rId62"/>
+    <p:sldId id="311" r:id="rId63"/>
   </p:sldIdLst>
   <p:sldSz cx="9144000" cy="6858000"/>
   <p:notesSz cx="6858000" cy="9144000"/>
@@ -2189,7 +2190,7 @@
       </p:grpSpPr>
       <p:sp>
         <p:nvSpPr>
-          <p:cNvPr id="298" name="Shape 298"/>
+          <p:cNvPr id="299" name="Shape 299"/>
           <p:cNvSpPr/>
           <p:nvPr>
             <p:ph type="sldImg"/>
@@ -2210,7 +2211,7 @@
       </p:sp>
       <p:sp>
         <p:nvSpPr>
-          <p:cNvPr id="299" name="Shape 299"/>
+          <p:cNvPr id="300" name="Shape 300"/>
           <p:cNvSpPr/>
           <p:nvPr>
             <p:ph type="body" sz="quarter" idx="1"/>
@@ -2227,7 +2228,61 @@
           <a:p>
             <a:pPr/>
             <a:r>
-              <a:t>Here's a flowchart that shows a conditional with more than one option.</a:t>
+              <a:t>Thinking about multiple choice forms can be helpful to thinking about how we can use conditionals to change Python's behavior.</a:t>
+            </a:r>
+          </a:p>
+          <a:p>
+            <a:pPr/>
+            <a:r>
+              <a:t>In the previous example, we saw </a:t>
+            </a:r>
+            <a:r>
+              <a:rPr>
+                <a:latin typeface="Avenir Heavy"/>
+                <a:ea typeface="Avenir Heavy"/>
+                <a:cs typeface="Avenir Heavy"/>
+                <a:sym typeface="Avenir Heavy"/>
+              </a:rPr>
+              <a:t>if</a:t>
+            </a:r>
+            <a:r>
+              <a:t> and </a:t>
+            </a:r>
+            <a:r>
+              <a:rPr>
+                <a:latin typeface="Avenir Heavy"/>
+                <a:ea typeface="Avenir Heavy"/>
+                <a:cs typeface="Avenir Heavy"/>
+                <a:sym typeface="Avenir Heavy"/>
+              </a:rPr>
+              <a:t>else. </a:t>
+            </a:r>
+            <a:r>
+              <a:t>Now we'll take a look at </a:t>
+            </a:r>
+            <a:r>
+              <a:rPr>
+                <a:latin typeface="Avenir Heavy"/>
+                <a:ea typeface="Avenir Heavy"/>
+                <a:cs typeface="Avenir Heavy"/>
+                <a:sym typeface="Avenir Heavy"/>
+              </a:rPr>
+              <a:t>elif</a:t>
+            </a:r>
+            <a:r>
+              <a:t>, which is used to create a multiple-choice structure.</a:t>
+            </a:r>
+          </a:p>
+          <a:p>
+            <a:pPr/>
+            <a:r>
+              <a:t>We're pretty familiar with the image on the left: you can only choose one. Do you live in DC, or Maryland, or Virginia, or somewhere else?</a:t>
+            </a:r>
+          </a:p>
+          <a:p>
+            <a:pPr/>
+            <a:r>
+              <a:t>And the image on the right is exactly the same -- just in Python code.</a:t>
             </a:r>
           </a:p>
         </p:txBody>
@@ -2259,7 +2314,7 @@
       </p:grpSpPr>
       <p:sp>
         <p:nvSpPr>
-          <p:cNvPr id="304" name="Shape 304"/>
+          <p:cNvPr id="305" name="Shape 305"/>
           <p:cNvSpPr/>
           <p:nvPr>
             <p:ph type="sldImg"/>
@@ -2280,7 +2335,7 @@
       </p:sp>
       <p:sp>
         <p:nvSpPr>
-          <p:cNvPr id="305" name="Shape 305"/>
+          <p:cNvPr id="306" name="Shape 306"/>
           <p:cNvSpPr/>
           <p:nvPr>
             <p:ph type="body" sz="quarter" idx="1"/>
@@ -2297,13 +2352,7 @@
           <a:p>
             <a:pPr/>
             <a:r>
-              <a:t>Our first conditional in line 3 asks "is teaching assistants exactly equal to zero"? If that's not true, then the "elif" statement in line 5 will ask, "is teaching assistants less than students divided by 5 (which is roughly 5 students per table?)".  Elif is like "but, if".</a:t>
-            </a:r>
-          </a:p>
-          <a:p>
-            <a:pPr/>
-            <a:r>
-              <a:t>If neither of those is true, then lines 7-8 will run. </a:t>
+              <a:t>Here's a flowchart that shows a conditional with more than one option.</a:t>
             </a:r>
           </a:p>
         </p:txBody>
@@ -2405,7 +2454,7 @@
       </p:grpSpPr>
       <p:sp>
         <p:nvSpPr>
-          <p:cNvPr id="310" name="Shape 310"/>
+          <p:cNvPr id="311" name="Shape 311"/>
           <p:cNvSpPr/>
           <p:nvPr>
             <p:ph type="sldImg"/>
@@ -2426,7 +2475,7 @@
       </p:sp>
       <p:sp>
         <p:nvSpPr>
-          <p:cNvPr id="311" name="Shape 311"/>
+          <p:cNvPr id="312" name="Shape 312"/>
           <p:cNvSpPr/>
           <p:nvPr>
             <p:ph type="body" sz="quarter" idx="1"/>
@@ -2443,19 +2492,13 @@
           <a:p>
             <a:pPr/>
             <a:r>
-              <a:t>Let's put those two flowcharts together.</a:t>
-            </a:r>
-          </a:p>
-          <a:p>
-            <a:pPr/>
-            <a:r>
-              <a:t>Important to note here: Lines 6-9 and 11-16 are evaluated separately.</a:t>
-            </a:r>
-          </a:p>
-          <a:p>
-            <a:pPr/>
-            <a:r>
-              <a:t>In other words, the questions are asked separately.</a:t>
+              <a:t>Our first conditional in line 3 asks "is teaching assistants exactly equal to zero"? If that's not true, then the "elif" statement in line 5 will ask, "is teaching assistants less than students divided by 5 (which is roughly 5 students per table?)".  Elif is like "but, if".</a:t>
+            </a:r>
+          </a:p>
+          <a:p>
+            <a:pPr/>
+            <a:r>
+              <a:t>If neither of those is true, then lines 7-8 will run. </a:t>
             </a:r>
           </a:p>
         </p:txBody>
@@ -2487,7 +2530,7 @@
       </p:grpSpPr>
       <p:sp>
         <p:nvSpPr>
-          <p:cNvPr id="316" name="Shape 316"/>
+          <p:cNvPr id="317" name="Shape 317"/>
           <p:cNvSpPr/>
           <p:nvPr>
             <p:ph type="sldImg"/>
@@ -2508,7 +2551,7 @@
       </p:sp>
       <p:sp>
         <p:nvSpPr>
-          <p:cNvPr id="317" name="Shape 317"/>
+          <p:cNvPr id="318" name="Shape 318"/>
           <p:cNvSpPr/>
           <p:nvPr>
             <p:ph type="body" sz="quarter" idx="1"/>
@@ -2525,7 +2568,19 @@
           <a:p>
             <a:pPr/>
             <a:r>
-              <a:t>Remind students that comments are good for designing the structure of your program before you actually write the code.</a:t>
+              <a:t>Let's put those two flowcharts together.</a:t>
+            </a:r>
+          </a:p>
+          <a:p>
+            <a:pPr/>
+            <a:r>
+              <a:t>Important to note here: Lines 6-9 and 11-16 are evaluated separately.</a:t>
+            </a:r>
+          </a:p>
+          <a:p>
+            <a:pPr/>
+            <a:r>
+              <a:t>In other words, the questions are asked separately.</a:t>
             </a:r>
           </a:p>
         </p:txBody>
@@ -2627,7 +2682,7 @@
       </p:grpSpPr>
       <p:sp>
         <p:nvSpPr>
-          <p:cNvPr id="329" name="Shape 329"/>
+          <p:cNvPr id="330" name="Shape 330"/>
           <p:cNvSpPr/>
           <p:nvPr>
             <p:ph type="sldImg"/>
@@ -2648,7 +2703,7 @@
       </p:sp>
       <p:sp>
         <p:nvSpPr>
-          <p:cNvPr id="330" name="Shape 330"/>
+          <p:cNvPr id="331" name="Shape 331"/>
           <p:cNvSpPr/>
           <p:nvPr>
             <p:ph type="body" sz="quarter" idx="1"/>
@@ -2665,13 +2720,7 @@
           <a:p>
             <a:pPr/>
             <a:r>
-              <a:t>Play around with your numbers and test! Did you get the results you were expecting?</a:t>
-            </a:r>
-          </a:p>
-          <a:p>
-            <a:pPr/>
-            <a:r>
-              <a:t>As a stretch goal, how many volunteers are you above or behind by?</a:t>
+              <a:t>Remind students that comments are good for designing the structure of your program before you actually write the code.</a:t>
             </a:r>
           </a:p>
         </p:txBody>
@@ -2703,7 +2752,7 @@
       </p:grpSpPr>
       <p:sp>
         <p:nvSpPr>
-          <p:cNvPr id="355" name="Shape 355"/>
+          <p:cNvPr id="336" name="Shape 336"/>
           <p:cNvSpPr/>
           <p:nvPr>
             <p:ph type="sldImg"/>
@@ -2724,7 +2773,7 @@
       </p:sp>
       <p:sp>
         <p:nvSpPr>
-          <p:cNvPr id="356" name="Shape 356"/>
+          <p:cNvPr id="337" name="Shape 337"/>
           <p:cNvSpPr/>
           <p:nvPr>
             <p:ph type="body" sz="quarter" idx="1"/>
@@ -2741,7 +2790,13 @@
           <a:p>
             <a:pPr/>
             <a:r>
-              <a:t>Explain how lines 8-14 will only run when the lesson is greater than or equal to four.</a:t>
+              <a:t>Play around with your numbers and test! Did you get the results you were expecting?</a:t>
+            </a:r>
+          </a:p>
+          <a:p>
+            <a:pPr/>
+            <a:r>
+              <a:t>As a stretch goal, how many volunteers are you above or behind by?</a:t>
             </a:r>
           </a:p>
         </p:txBody>
@@ -2773,7 +2828,7 @@
       </p:grpSpPr>
       <p:sp>
         <p:nvSpPr>
-          <p:cNvPr id="361" name="Shape 361"/>
+          <p:cNvPr id="362" name="Shape 362"/>
           <p:cNvSpPr/>
           <p:nvPr>
             <p:ph type="sldImg"/>
@@ -2794,7 +2849,77 @@
       </p:sp>
       <p:sp>
         <p:nvSpPr>
-          <p:cNvPr id="362" name="Shape 362"/>
+          <p:cNvPr id="363" name="Shape 363"/>
+          <p:cNvSpPr/>
+          <p:nvPr>
+            <p:ph type="body" sz="quarter" idx="1"/>
+          </p:nvPr>
+        </p:nvSpPr>
+        <p:spPr>
+          <a:prstGeom prst="rect">
+            <a:avLst/>
+          </a:prstGeom>
+        </p:spPr>
+        <p:txBody>
+          <a:bodyPr/>
+          <a:lstStyle/>
+          <a:p>
+            <a:pPr/>
+            <a:r>
+              <a:t>Explain how lines 8-14 will only run when the lesson is greater than or equal to four.</a:t>
+            </a:r>
+          </a:p>
+        </p:txBody>
+      </p:sp>
+    </p:spTree>
+  </p:cSld>
+  <p:clrMapOvr>
+    <a:masterClrMapping/>
+  </p:clrMapOvr>
+</p:notes>
+</file>
+
+<file path=ppt/notesSlides/notesSlide36.xml><?xml version="1.0" encoding="utf-8"?>
+<p:notes xmlns:a="http://schemas.openxmlformats.org/drawingml/2006/main" xmlns:r="http://schemas.openxmlformats.org/officeDocument/2006/relationships" xmlns:p="http://schemas.openxmlformats.org/presentationml/2006/main" showMasterSp="1" showMasterPhAnim="1">
+  <p:cSld>
+    <p:spTree>
+      <p:nvGrpSpPr>
+        <p:cNvPr id="1" name=""/>
+        <p:cNvGrpSpPr/>
+        <p:nvPr/>
+      </p:nvGrpSpPr>
+      <p:grpSpPr>
+        <a:xfrm>
+          <a:off x="0" y="0"/>
+          <a:ext cx="0" cy="0"/>
+          <a:chOff x="0" y="0"/>
+          <a:chExt cx="0" cy="0"/>
+        </a:xfrm>
+      </p:grpSpPr>
+      <p:sp>
+        <p:nvSpPr>
+          <p:cNvPr id="368" name="Shape 368"/>
+          <p:cNvSpPr/>
+          <p:nvPr>
+            <p:ph type="sldImg"/>
+          </p:nvPr>
+        </p:nvSpPr>
+        <p:spPr>
+          <a:prstGeom prst="rect">
+            <a:avLst/>
+          </a:prstGeom>
+        </p:spPr>
+        <p:txBody>
+          <a:bodyPr/>
+          <a:lstStyle/>
+          <a:p>
+            <a:pPr/>
+          </a:p>
+        </p:txBody>
+      </p:sp>
+      <p:sp>
+        <p:nvSpPr>
+          <p:cNvPr id="369" name="Shape 369"/>
           <p:cNvSpPr/>
           <p:nvPr>
             <p:ph type="body" sz="quarter" idx="1"/>
@@ -14715,7 +14840,7 @@
       </p:grpSpPr>
       <p:sp>
         <p:nvSpPr>
-          <p:cNvPr id="295" name="cONDITIONALS"/>
+          <p:cNvPr id="295" name="Multiple Choice: ELIF"/>
           <p:cNvSpPr txBox="1"/>
           <p:nvPr>
             <p:ph type="body" sz="quarter" idx="1"/>
@@ -14757,7 +14882,7 @@
           <a:p>
             <a:pPr/>
             <a:r>
-              <a:t>cONDITIONALS</a:t>
+              <a:t>Multiple Choice: ELIF</a:t>
             </a:r>
           </a:p>
         </p:txBody>
@@ -14795,7 +14920,7 @@
       </p:sp>
       <p:pic>
         <p:nvPicPr>
-          <p:cNvPr id="297" name="flowchart_2.png" descr="flowchart_2.png"/>
+          <p:cNvPr id="297" name="hmc_multiple-choice.png" descr="hmc_multiple-choice.png"/>
           <p:cNvPicPr>
             <a:picLocks noChangeAspect="1"/>
           </p:cNvPicPr>
@@ -14811,8 +14936,37 @@
         </p:blipFill>
         <p:spPr>
           <a:xfrm>
-            <a:off x="0" y="1690884"/>
-            <a:ext cx="9144000" cy="3476232"/>
+            <a:off x="723969" y="2127250"/>
+            <a:ext cx="2463801" cy="2603500"/>
+          </a:xfrm>
+          <a:prstGeom prst="rect">
+            <a:avLst/>
+          </a:prstGeom>
+          <a:ln w="12700">
+            <a:miter lim="400000"/>
+          </a:ln>
+        </p:spPr>
+      </p:pic>
+      <p:pic>
+        <p:nvPicPr>
+          <p:cNvPr id="298" name="hmc_multiple-choice-2.png" descr="hmc_multiple-choice-2.png"/>
+          <p:cNvPicPr>
+            <a:picLocks noChangeAspect="1"/>
+          </p:cNvPicPr>
+          <p:nvPr/>
+        </p:nvPicPr>
+        <p:blipFill>
+          <a:blip r:embed="rId4">
+            <a:extLst/>
+          </a:blip>
+          <a:stretch>
+            <a:fillRect/>
+          </a:stretch>
+        </p:blipFill>
+        <p:spPr>
+          <a:xfrm>
+            <a:off x="3302000" y="2247900"/>
+            <a:ext cx="5168900" cy="2362200"/>
           </a:xfrm>
           <a:prstGeom prst="rect">
             <a:avLst/>
@@ -14850,7 +15004,7 @@
       </p:grpSpPr>
       <p:sp>
         <p:nvSpPr>
-          <p:cNvPr id="301" name="cONDITIONALS"/>
+          <p:cNvPr id="302" name="cONDITIONALS"/>
           <p:cNvSpPr txBox="1"/>
           <p:nvPr>
             <p:ph type="body" sz="quarter" idx="1"/>
@@ -14899,7 +15053,7 @@
       </p:sp>
       <p:sp>
         <p:nvSpPr>
-          <p:cNvPr id="302" name="Slide Number"/>
+          <p:cNvPr id="303" name="Slide Number"/>
           <p:cNvSpPr txBox="1"/>
           <p:nvPr>
             <p:ph type="sldNum" sz="quarter" idx="2"/>
@@ -14930,7 +15084,7 @@
       </p:sp>
       <p:pic>
         <p:nvPicPr>
-          <p:cNvPr id="303" name="hmc_flowchart-2.png" descr="hmc_flowchart-2.png"/>
+          <p:cNvPr id="304" name="flowchart_2.png" descr="flowchart_2.png"/>
           <p:cNvPicPr>
             <a:picLocks noChangeAspect="1"/>
           </p:cNvPicPr>
@@ -14946,8 +15100,8 @@
         </p:blipFill>
         <p:spPr>
           <a:xfrm>
-            <a:off x="524669" y="1949688"/>
-            <a:ext cx="8094662" cy="2958624"/>
+            <a:off x="0" y="1690884"/>
+            <a:ext cx="9144000" cy="3476232"/>
           </a:xfrm>
           <a:prstGeom prst="rect">
             <a:avLst/>
@@ -14985,7 +15139,7 @@
       </p:grpSpPr>
       <p:sp>
         <p:nvSpPr>
-          <p:cNvPr id="307" name="cONDITIONALS"/>
+          <p:cNvPr id="308" name="cONDITIONALS"/>
           <p:cNvSpPr txBox="1"/>
           <p:nvPr>
             <p:ph type="body" sz="quarter" idx="1"/>
@@ -15034,7 +15188,7 @@
       </p:sp>
       <p:sp>
         <p:nvSpPr>
-          <p:cNvPr id="308" name="Slide Number"/>
+          <p:cNvPr id="309" name="Slide Number"/>
           <p:cNvSpPr txBox="1"/>
           <p:nvPr>
             <p:ph type="sldNum" sz="quarter" idx="2"/>
@@ -15065,7 +15219,7 @@
       </p:sp>
       <p:pic>
         <p:nvPicPr>
-          <p:cNvPr id="309" name="flowchart_2a.png" descr="flowchart_2a.png"/>
+          <p:cNvPr id="310" name="hmc_flowchart-2.png" descr="hmc_flowchart-2.png"/>
           <p:cNvPicPr>
             <a:picLocks noChangeAspect="1"/>
           </p:cNvPicPr>
@@ -15081,8 +15235,8 @@
         </p:blipFill>
         <p:spPr>
           <a:xfrm>
-            <a:off x="1564510" y="1103629"/>
-            <a:ext cx="6342543" cy="4887097"/>
+            <a:off x="524669" y="1949688"/>
+            <a:ext cx="8094662" cy="2958624"/>
           </a:xfrm>
           <a:prstGeom prst="rect">
             <a:avLst/>
@@ -15120,7 +15274,56 @@
       </p:grpSpPr>
       <p:sp>
         <p:nvSpPr>
-          <p:cNvPr id="313" name="Slide Number"/>
+          <p:cNvPr id="314" name="cONDITIONALS"/>
+          <p:cNvSpPr txBox="1"/>
+          <p:nvPr>
+            <p:ph type="body" sz="quarter" idx="1"/>
+          </p:nvPr>
+        </p:nvSpPr>
+        <p:spPr>
+          <a:xfrm>
+            <a:off x="0" y="206107"/>
+            <a:ext cx="8686800" cy="812483"/>
+          </a:xfrm>
+          <a:prstGeom prst="rect">
+            <a:avLst/>
+          </a:prstGeom>
+          <a:solidFill>
+            <a:srgbClr val="FFFFFF">
+              <a:alpha val="70000"/>
+            </a:srgbClr>
+          </a:solidFill>
+        </p:spPr>
+        <p:txBody>
+          <a:bodyPr lIns="91439" tIns="91439" rIns="91439" bIns="91439" anchor="ctr">
+            <a:normAutofit fontScale="100000" lnSpcReduction="0"/>
+          </a:bodyPr>
+          <a:lstStyle>
+            <a:lvl1pPr marL="0" indent="0">
+              <a:spcBef>
+                <a:spcPts val="900"/>
+              </a:spcBef>
+              <a:buSzTx/>
+              <a:buNone/>
+              <a:defRPr cap="all" sz="4000">
+                <a:latin typeface="+mn-lt"/>
+                <a:ea typeface="+mn-ea"/>
+                <a:cs typeface="+mn-cs"/>
+                <a:sym typeface="Century Gothic"/>
+              </a:defRPr>
+            </a:lvl1pPr>
+          </a:lstStyle>
+          <a:p>
+            <a:pPr/>
+            <a:r>
+              <a:t>cONDITIONALS</a:t>
+            </a:r>
+          </a:p>
+        </p:txBody>
+      </p:sp>
+      <p:sp>
+        <p:nvSpPr>
+          <p:cNvPr id="315" name="Slide Number"/>
           <p:cNvSpPr txBox="1"/>
           <p:nvPr>
             <p:ph type="sldNum" sz="quarter" idx="2"/>
@@ -15149,62 +15352,9 @@
           </a:p>
         </p:txBody>
       </p:sp>
-      <p:sp>
-        <p:nvSpPr>
-          <p:cNvPr id="314" name="More examples of cONDITIONALS"/>
-          <p:cNvSpPr/>
-          <p:nvPr/>
-        </p:nvSpPr>
-        <p:spPr>
-          <a:xfrm>
-            <a:off x="0" y="206107"/>
-            <a:ext cx="8686800" cy="812483"/>
-          </a:xfrm>
-          <a:prstGeom prst="rect">
-            <a:avLst/>
-          </a:prstGeom>
-          <a:solidFill>
-            <a:srgbClr val="FFFFFF">
-              <a:alpha val="70000"/>
-            </a:srgbClr>
-          </a:solidFill>
-          <a:ln w="12700">
-            <a:miter lim="400000"/>
-          </a:ln>
-          <a:extLst>
-            <a:ext uri="{C572A759-6A51-4108-AA02-DFA0A04FC94B}">
-              <ma14:wrappingTextBoxFlag xmlns:ma14="http://schemas.microsoft.com/office/mac/drawingml/2011/main" val="1"/>
-            </a:ext>
-          </a:extLst>
-        </p:spPr>
-        <p:txBody>
-          <a:bodyPr tIns="91439" bIns="91439" anchor="ctr">
-            <a:normAutofit fontScale="100000" lnSpcReduction="0"/>
-          </a:bodyPr>
-          <a:lstStyle>
-            <a:lvl1pPr defTabSz="438911">
-              <a:spcBef>
-                <a:spcPts val="900"/>
-              </a:spcBef>
-              <a:defRPr cap="all" sz="3839">
-                <a:latin typeface="+mn-lt"/>
-                <a:ea typeface="+mn-ea"/>
-                <a:cs typeface="+mn-cs"/>
-                <a:sym typeface="Century Gothic"/>
-              </a:defRPr>
-            </a:lvl1pPr>
-          </a:lstStyle>
-          <a:p>
-            <a:pPr/>
-            <a:r>
-              <a:t>More examples of cONDITIONALS</a:t>
-            </a:r>
-          </a:p>
-        </p:txBody>
-      </p:sp>
       <p:pic>
         <p:nvPicPr>
-          <p:cNvPr id="315" name="hmc_tickets-remaining.png" descr="hmc_tickets-remaining.png"/>
+          <p:cNvPr id="316" name="flowchart_2a.png" descr="flowchart_2a.png"/>
           <p:cNvPicPr>
             <a:picLocks noChangeAspect="1"/>
           </p:cNvPicPr>
@@ -15220,8 +15370,8 @@
         </p:blipFill>
         <p:spPr>
           <a:xfrm>
-            <a:off x="577850" y="2127250"/>
-            <a:ext cx="7988300" cy="2603500"/>
+            <a:off x="1564510" y="1103629"/>
+            <a:ext cx="6342543" cy="4887097"/>
           </a:xfrm>
           <a:prstGeom prst="rect">
             <a:avLst/>
@@ -15259,32 +15409,6 @@
       </p:grpSpPr>
       <p:sp>
         <p:nvSpPr>
-          <p:cNvPr id="319" name="Body"/>
-          <p:cNvSpPr txBox="1"/>
-          <p:nvPr>
-            <p:ph type="body" idx="1"/>
-          </p:nvPr>
-        </p:nvSpPr>
-        <p:spPr>
-          <a:prstGeom prst="rect">
-            <a:avLst/>
-          </a:prstGeom>
-        </p:spPr>
-        <p:txBody>
-          <a:bodyPr>
-            <a:normAutofit fontScale="100000" lnSpcReduction="0"/>
-          </a:bodyPr>
-          <a:lstStyle/>
-          <a:p>
-            <a:pPr>
-              <a:buSzTx/>
-              <a:buNone/>
-            </a:pPr>
-          </a:p>
-        </p:txBody>
-      </p:sp>
-      <p:sp>
-        <p:nvSpPr>
           <p:cNvPr id="320" name="Slide Number"/>
           <p:cNvSpPr txBox="1"/>
           <p:nvPr>
@@ -15369,7 +15493,7 @@
       </p:sp>
       <p:pic>
         <p:nvPicPr>
-          <p:cNvPr id="322" name="hmc_conditionals-2.png" descr="hmc_conditionals-2.png"/>
+          <p:cNvPr id="322" name="hmc_tickets-remaining.png" descr="hmc_tickets-remaining.png"/>
           <p:cNvPicPr>
             <a:picLocks noChangeAspect="1"/>
           </p:cNvPicPr>
@@ -15385,8 +15509,8 @@
         </p:blipFill>
         <p:spPr>
           <a:xfrm>
-            <a:off x="508000" y="1174750"/>
-            <a:ext cx="8128000" cy="4508500"/>
+            <a:off x="577850" y="2127250"/>
+            <a:ext cx="7988300" cy="2603500"/>
           </a:xfrm>
           <a:prstGeom prst="rect">
             <a:avLst/>
@@ -15424,7 +15548,7 @@
       </p:grpSpPr>
       <p:sp>
         <p:nvSpPr>
-          <p:cNvPr id="326" name="Create two variables (volunteers, goal)…"/>
+          <p:cNvPr id="326" name="Body"/>
           <p:cNvSpPr txBox="1"/>
           <p:nvPr>
             <p:ph type="body" idx="1"/>
@@ -15441,111 +15565,10 @@
           </a:bodyPr>
           <a:lstStyle/>
           <a:p>
-            <a:pPr marL="221742" indent="-221742" defTabSz="443484">
-              <a:defRPr sz="3104">
-                <a:latin typeface="+mn-lt"/>
-                <a:ea typeface="+mn-ea"/>
-                <a:cs typeface="+mn-cs"/>
-                <a:sym typeface="Century Gothic"/>
-              </a:defRPr>
-            </a:pPr>
-            <a:r>
-              <a:t>Create two variables (</a:t>
-            </a:r>
-            <a:r>
-              <a:rPr b="1"/>
-              <a:t>volunteers</a:t>
-            </a:r>
-            <a:r>
-              <a:t>, </a:t>
-            </a:r>
-            <a:r>
-              <a:rPr b="1"/>
-              <a:t>goal</a:t>
-            </a:r>
-            <a:r>
-              <a:t>)</a:t>
-            </a:r>
-          </a:p>
-          <a:p>
-            <a:pPr marL="221742" indent="-221742" defTabSz="443484">
-              <a:defRPr sz="3104">
-                <a:latin typeface="+mn-lt"/>
-                <a:ea typeface="+mn-ea"/>
-                <a:cs typeface="+mn-cs"/>
-                <a:sym typeface="Century Gothic"/>
-              </a:defRPr>
-            </a:pPr>
-            <a:r>
-              <a:t>Tell the user whether they are </a:t>
-            </a:r>
-            <a:r>
-              <a:rPr b="1"/>
-              <a:t>above</a:t>
-            </a:r>
-            <a:r>
-              <a:t>, </a:t>
-            </a:r>
-            <a:r>
-              <a:rPr b="1"/>
-              <a:t>below</a:t>
-            </a:r>
-            <a:r>
-              <a:t>, or </a:t>
-            </a:r>
-            <a:r>
-              <a:rPr b="1"/>
-              <a:t>at</a:t>
-            </a:r>
-            <a:r>
-              <a:t> their recruitment goal.</a:t>
-            </a:r>
-          </a:p>
-          <a:p>
-            <a:pPr marL="221742" indent="-221742" defTabSz="443484">
-              <a:defRPr sz="3104">
-                <a:latin typeface="+mn-lt"/>
-                <a:ea typeface="+mn-ea"/>
-                <a:cs typeface="+mn-cs"/>
-                <a:sym typeface="Century Gothic"/>
-              </a:defRPr>
-            </a:pPr>
-          </a:p>
-          <a:p>
-            <a:pPr marL="221742" indent="-221742" defTabSz="443484">
-              <a:defRPr sz="3104">
-                <a:latin typeface="+mn-lt"/>
-                <a:ea typeface="+mn-ea"/>
-                <a:cs typeface="+mn-cs"/>
-                <a:sym typeface="Century Gothic"/>
-              </a:defRPr>
-            </a:pPr>
-            <a:r>
-              <a:t>Example:</a:t>
-            </a:r>
-            <a:br/>
-            <a:r>
-              <a:t>Volunteers: 90</a:t>
-            </a:r>
-            <a:br/>
-            <a:r>
-              <a:t>Goal: 100</a:t>
-            </a:r>
-          </a:p>
-          <a:p>
-            <a:pPr marL="332613" indent="-332613" defTabSz="443484">
+            <a:pPr>
               <a:buSzTx/>
               <a:buNone/>
-              <a:defRPr sz="3104">
-                <a:latin typeface="+mn-lt"/>
-                <a:ea typeface="+mn-ea"/>
-                <a:cs typeface="+mn-cs"/>
-                <a:sym typeface="Century Gothic"/>
-              </a:defRPr>
-            </a:pPr>
-            <a:r>
-              <a:t>&gt;&gt;&gt; You are behind!</a:t>
-            </a:r>
+            </a:pPr>
           </a:p>
         </p:txBody>
       </p:sp>
@@ -15582,7 +15605,7 @@
       </p:sp>
       <p:sp>
         <p:nvSpPr>
-          <p:cNvPr id="328" name="cONDITIONALS: exercise"/>
+          <p:cNvPr id="328" name="More examples of cONDITIONALS"/>
           <p:cNvSpPr/>
           <p:nvPr/>
         </p:nvSpPr>
@@ -15613,11 +15636,11 @@
             <a:normAutofit fontScale="100000" lnSpcReduction="0"/>
           </a:bodyPr>
           <a:lstStyle>
-            <a:lvl1pPr>
+            <a:lvl1pPr defTabSz="438911">
               <a:spcBef>
                 <a:spcPts val="900"/>
               </a:spcBef>
-              <a:defRPr cap="all" sz="4000">
+              <a:defRPr cap="all" sz="3839">
                 <a:latin typeface="+mn-lt"/>
                 <a:ea typeface="+mn-ea"/>
                 <a:cs typeface="+mn-cs"/>
@@ -15628,11 +15651,40 @@
           <a:p>
             <a:pPr/>
             <a:r>
-              <a:t>cONDITIONALS: exercise</a:t>
-            </a:r>
-          </a:p>
-        </p:txBody>
-      </p:sp>
+              <a:t>More examples of cONDITIONALS</a:t>
+            </a:r>
+          </a:p>
+        </p:txBody>
+      </p:sp>
+      <p:pic>
+        <p:nvPicPr>
+          <p:cNvPr id="329" name="hmc_conditionals-2.png" descr="hmc_conditionals-2.png"/>
+          <p:cNvPicPr>
+            <a:picLocks noChangeAspect="1"/>
+          </p:cNvPicPr>
+          <p:nvPr/>
+        </p:nvPicPr>
+        <p:blipFill>
+          <a:blip r:embed="rId3">
+            <a:extLst/>
+          </a:blip>
+          <a:stretch>
+            <a:fillRect/>
+          </a:stretch>
+        </p:blipFill>
+        <p:spPr>
+          <a:xfrm>
+            <a:off x="508000" y="1174750"/>
+            <a:ext cx="8128000" cy="4508500"/>
+          </a:xfrm>
+          <a:prstGeom prst="rect">
+            <a:avLst/>
+          </a:prstGeom>
+          <a:ln w="12700">
+            <a:miter lim="400000"/>
+          </a:ln>
+        </p:spPr>
+      </p:pic>
     </p:spTree>
   </p:cSld>
   <p:clrMapOvr>
@@ -15880,17 +15932,13 @@
       </p:grpSpPr>
       <p:sp>
         <p:nvSpPr>
-          <p:cNvPr id="332" name="The in keyword, when used with a conditional, tells you whether some text appears in a string."/>
+          <p:cNvPr id="333" name="Create two variables (volunteers, goal)…"/>
           <p:cNvSpPr txBox="1"/>
           <p:nvPr>
             <p:ph type="body" idx="1"/>
           </p:nvPr>
         </p:nvSpPr>
         <p:spPr>
-          <a:xfrm>
-            <a:off x="441959" y="1354655"/>
-            <a:ext cx="8244842" cy="4924225"/>
-          </a:xfrm>
           <a:prstGeom prst="rect">
             <a:avLst/>
           </a:prstGeom>
@@ -15901,82 +15949,117 @@
           </a:bodyPr>
           <a:lstStyle/>
           <a:p>
-            <a:pPr>
+            <a:pPr marL="221742" indent="-221742" defTabSz="443484">
+              <a:defRPr sz="3104">
+                <a:latin typeface="+mn-lt"/>
+                <a:ea typeface="+mn-ea"/>
+                <a:cs typeface="+mn-cs"/>
+                <a:sym typeface="Century Gothic"/>
+              </a:defRPr>
+            </a:pPr>
+            <a:r>
+              <a:t>Create two variables (</a:t>
+            </a:r>
+            <a:r>
+              <a:rPr b="1"/>
+              <a:t>volunteers</a:t>
+            </a:r>
+            <a:r>
+              <a:t>, </a:t>
+            </a:r>
+            <a:r>
+              <a:rPr b="1"/>
+              <a:t>goal</a:t>
+            </a:r>
+            <a:r>
+              <a:t>)</a:t>
+            </a:r>
+          </a:p>
+          <a:p>
+            <a:pPr marL="221742" indent="-221742" defTabSz="443484">
+              <a:defRPr sz="3104">
+                <a:latin typeface="+mn-lt"/>
+                <a:ea typeface="+mn-ea"/>
+                <a:cs typeface="+mn-cs"/>
+                <a:sym typeface="Century Gothic"/>
+              </a:defRPr>
+            </a:pPr>
+            <a:r>
+              <a:t>Tell the user whether they are </a:t>
+            </a:r>
+            <a:r>
+              <a:rPr b="1"/>
+              <a:t>above</a:t>
+            </a:r>
+            <a:r>
+              <a:t>, </a:t>
+            </a:r>
+            <a:r>
+              <a:rPr b="1"/>
+              <a:t>below</a:t>
+            </a:r>
+            <a:r>
+              <a:t>, or </a:t>
+            </a:r>
+            <a:r>
+              <a:rPr b="1"/>
+              <a:t>at</a:t>
+            </a:r>
+            <a:r>
+              <a:t> their recruitment goal.</a:t>
+            </a:r>
+          </a:p>
+          <a:p>
+            <a:pPr marL="221742" indent="-221742" defTabSz="443484">
+              <a:defRPr sz="3104">
+                <a:latin typeface="+mn-lt"/>
+                <a:ea typeface="+mn-ea"/>
+                <a:cs typeface="+mn-cs"/>
+                <a:sym typeface="Century Gothic"/>
+              </a:defRPr>
+            </a:pPr>
+          </a:p>
+          <a:p>
+            <a:pPr marL="221742" indent="-221742" defTabSz="443484">
+              <a:defRPr sz="3104">
+                <a:latin typeface="+mn-lt"/>
+                <a:ea typeface="+mn-ea"/>
+                <a:cs typeface="+mn-cs"/>
+                <a:sym typeface="Century Gothic"/>
+              </a:defRPr>
+            </a:pPr>
+            <a:r>
+              <a:t>Example:</a:t>
+            </a:r>
+            <a:br/>
+            <a:r>
+              <a:t>Volunteers: 90</a:t>
+            </a:r>
+            <a:br/>
+            <a:r>
+              <a:t>Goal: 100</a:t>
+            </a:r>
+          </a:p>
+          <a:p>
+            <a:pPr marL="332613" indent="-332613" defTabSz="443484">
               <a:buSzTx/>
               <a:buNone/>
-            </a:pPr>
-            <a:r>
-              <a:rPr>
-                <a:latin typeface="+mn-lt"/>
-                <a:ea typeface="+mn-ea"/>
-                <a:cs typeface="+mn-cs"/>
-                <a:sym typeface="Century Gothic"/>
-              </a:rPr>
-              <a:t>The </a:t>
-            </a:r>
-            <a:r>
-              <a:rPr b="1">
-                <a:latin typeface="+mn-lt"/>
-                <a:ea typeface="+mn-ea"/>
-                <a:cs typeface="+mn-cs"/>
-                <a:sym typeface="Century Gothic"/>
-              </a:rPr>
-              <a:t>in</a:t>
-            </a:r>
-            <a:r>
-              <a:rPr>
-                <a:latin typeface="+mn-lt"/>
-                <a:ea typeface="+mn-ea"/>
-                <a:cs typeface="+mn-cs"/>
-                <a:sym typeface="Century Gothic"/>
-              </a:rPr>
-              <a:t> keyword, when used with a conditional, tells you whether some text appears </a:t>
-            </a:r>
-            <a:r>
-              <a:rPr b="1">
-                <a:latin typeface="+mn-lt"/>
-                <a:ea typeface="+mn-ea"/>
-                <a:cs typeface="+mn-cs"/>
-                <a:sym typeface="Century Gothic"/>
-              </a:rPr>
-              <a:t>in</a:t>
-            </a:r>
-            <a:r>
-              <a:rPr>
-                <a:latin typeface="+mn-lt"/>
-                <a:ea typeface="+mn-ea"/>
-                <a:cs typeface="+mn-cs"/>
-                <a:sym typeface="Century Gothic"/>
-              </a:rPr>
-              <a:t> a string.</a:t>
-            </a:r>
-            <a:endParaRPr>
-              <a:latin typeface="+mn-lt"/>
-              <a:ea typeface="+mn-ea"/>
-              <a:cs typeface="+mn-cs"/>
-              <a:sym typeface="Century Gothic"/>
-            </a:endParaRPr>
-          </a:p>
-          <a:p>
-            <a:pPr>
-              <a:spcBef>
-                <a:spcPts val="600"/>
-              </a:spcBef>
-              <a:buSzTx/>
-              <a:buNone/>
-              <a:defRPr b="1" sz="2800">
-                <a:latin typeface="Courier New"/>
-                <a:ea typeface="Courier New"/>
-                <a:cs typeface="Courier New"/>
-                <a:sym typeface="Courier New"/>
+              <a:defRPr sz="3104">
+                <a:latin typeface="+mn-lt"/>
+                <a:ea typeface="+mn-ea"/>
+                <a:cs typeface="+mn-cs"/>
+                <a:sym typeface="Century Gothic"/>
               </a:defRPr>
             </a:pPr>
-          </a:p>
-        </p:txBody>
-      </p:sp>
-      <p:sp>
-        <p:nvSpPr>
-          <p:cNvPr id="333" name="Slide Number"/>
+            <a:r>
+              <a:t>&gt;&gt;&gt; You are behind!</a:t>
+            </a:r>
+          </a:p>
+        </p:txBody>
+      </p:sp>
+      <p:sp>
+        <p:nvSpPr>
+          <p:cNvPr id="334" name="Slide Number"/>
           <p:cNvSpPr txBox="1"/>
           <p:nvPr>
             <p:ph type="sldNum" sz="quarter" idx="2"/>
@@ -16007,7 +16090,7 @@
       </p:sp>
       <p:sp>
         <p:nvSpPr>
-          <p:cNvPr id="334" name="using The IN keyword"/>
+          <p:cNvPr id="335" name="cONDITIONALS: exercise"/>
           <p:cNvSpPr/>
           <p:nvPr/>
         </p:nvSpPr>
@@ -16053,40 +16136,11 @@
           <a:p>
             <a:pPr/>
             <a:r>
-              <a:t>using The IN keyword</a:t>
-            </a:r>
-          </a:p>
-        </p:txBody>
-      </p:sp>
-      <p:pic>
-        <p:nvPicPr>
-          <p:cNvPr id="335" name="hmc_article-in.png" descr="hmc_article-in.png"/>
-          <p:cNvPicPr>
-            <a:picLocks noChangeAspect="1"/>
-          </p:cNvPicPr>
-          <p:nvPr/>
-        </p:nvPicPr>
-        <p:blipFill>
-          <a:blip r:embed="rId2">
-            <a:extLst/>
-          </a:blip>
-          <a:stretch>
-            <a:fillRect/>
-          </a:stretch>
-        </p:blipFill>
-        <p:spPr>
-          <a:xfrm>
-            <a:off x="137409" y="3232150"/>
-            <a:ext cx="8890001" cy="2298700"/>
-          </a:xfrm>
-          <a:prstGeom prst="rect">
-            <a:avLst/>
-          </a:prstGeom>
-          <a:ln w="12700">
-            <a:miter lim="400000"/>
-          </a:ln>
-        </p:spPr>
-      </p:pic>
+              <a:t>cONDITIONALS: exercise</a:t>
+            </a:r>
+          </a:p>
+        </p:txBody>
+      </p:sp>
     </p:spTree>
   </p:cSld>
   <p:clrMapOvr>
@@ -16115,7 +16169,7 @@
       </p:grpSpPr>
       <p:sp>
         <p:nvSpPr>
-          <p:cNvPr id="337" name="You can use functions and methods as part of your conditional!"/>
+          <p:cNvPr id="339" name="The in keyword, when used with a conditional, tells you whether some text appears in a string."/>
           <p:cNvSpPr txBox="1"/>
           <p:nvPr>
             <p:ph type="body" idx="1"/>
@@ -16147,7 +16201,43 @@
                 <a:cs typeface="+mn-cs"/>
                 <a:sym typeface="Century Gothic"/>
               </a:rPr>
-              <a:t>You can use functions and methods as part of your conditional!</a:t>
+              <a:t>The </a:t>
+            </a:r>
+            <a:r>
+              <a:rPr b="1">
+                <a:latin typeface="+mn-lt"/>
+                <a:ea typeface="+mn-ea"/>
+                <a:cs typeface="+mn-cs"/>
+                <a:sym typeface="Century Gothic"/>
+              </a:rPr>
+              <a:t>in</a:t>
+            </a:r>
+            <a:r>
+              <a:rPr>
+                <a:latin typeface="+mn-lt"/>
+                <a:ea typeface="+mn-ea"/>
+                <a:cs typeface="+mn-cs"/>
+                <a:sym typeface="Century Gothic"/>
+              </a:rPr>
+              <a:t> keyword, when used with a conditional, tells you whether some text appears </a:t>
+            </a:r>
+            <a:r>
+              <a:rPr b="1">
+                <a:latin typeface="+mn-lt"/>
+                <a:ea typeface="+mn-ea"/>
+                <a:cs typeface="+mn-cs"/>
+                <a:sym typeface="Century Gothic"/>
+              </a:rPr>
+              <a:t>in</a:t>
+            </a:r>
+            <a:r>
+              <a:rPr>
+                <a:latin typeface="+mn-lt"/>
+                <a:ea typeface="+mn-ea"/>
+                <a:cs typeface="+mn-cs"/>
+                <a:sym typeface="Century Gothic"/>
+              </a:rPr>
+              <a:t> a string.</a:t>
             </a:r>
             <a:endParaRPr>
               <a:latin typeface="+mn-lt"/>
@@ -16175,7 +16265,7 @@
       </p:sp>
       <p:sp>
         <p:nvSpPr>
-          <p:cNvPr id="338" name="Slide Number"/>
+          <p:cNvPr id="340" name="Slide Number"/>
           <p:cNvSpPr txBox="1"/>
           <p:nvPr>
             <p:ph type="sldNum" sz="quarter" idx="2"/>
@@ -16206,7 +16296,7 @@
       </p:sp>
       <p:sp>
         <p:nvSpPr>
-          <p:cNvPr id="339" name="complex cONDITIONALS"/>
+          <p:cNvPr id="341" name="using The IN keyword"/>
           <p:cNvSpPr/>
           <p:nvPr/>
         </p:nvSpPr>
@@ -16252,14 +16342,14 @@
           <a:p>
             <a:pPr/>
             <a:r>
-              <a:t>complex cONDITIONALS</a:t>
+              <a:t>using The IN keyword</a:t>
             </a:r>
           </a:p>
         </p:txBody>
       </p:sp>
       <p:pic>
         <p:nvPicPr>
-          <p:cNvPr id="340" name="hmc_complex_conditionals.png" descr="hmc_complex_conditionals.png"/>
+          <p:cNvPr id="342" name="hmc_article-in.png" descr="hmc_article-in.png"/>
           <p:cNvPicPr>
             <a:picLocks noChangeAspect="1"/>
           </p:cNvPicPr>
@@ -16275,8 +16365,8 @@
         </p:blipFill>
         <p:spPr>
           <a:xfrm>
-            <a:off x="220979" y="3092559"/>
-            <a:ext cx="8686801" cy="2298701"/>
+            <a:off x="137409" y="3232150"/>
+            <a:ext cx="8890001" cy="2298700"/>
           </a:xfrm>
           <a:prstGeom prst="rect">
             <a:avLst/>
@@ -16314,7 +16404,7 @@
       </p:grpSpPr>
       <p:sp>
         <p:nvSpPr>
-          <p:cNvPr id="342" name="Using the and keyword, both conditions must be true for the print statement at line 7 to run."/>
+          <p:cNvPr id="344" name="You can use functions and methods as part of your conditional!"/>
           <p:cNvSpPr txBox="1"/>
           <p:nvPr>
             <p:ph type="body" idx="1"/>
@@ -16334,6 +16424,27 @@
             <a:normAutofit fontScale="100000" lnSpcReduction="0"/>
           </a:bodyPr>
           <a:lstStyle/>
+          <a:p>
+            <a:pPr>
+              <a:buSzTx/>
+              <a:buNone/>
+            </a:pPr>
+            <a:r>
+              <a:rPr>
+                <a:latin typeface="+mn-lt"/>
+                <a:ea typeface="+mn-ea"/>
+                <a:cs typeface="+mn-cs"/>
+                <a:sym typeface="Century Gothic"/>
+              </a:rPr>
+              <a:t>You can use functions and methods as part of your conditional!</a:t>
+            </a:r>
+            <a:endParaRPr>
+              <a:latin typeface="+mn-lt"/>
+              <a:ea typeface="+mn-ea"/>
+              <a:cs typeface="+mn-cs"/>
+              <a:sym typeface="Century Gothic"/>
+            </a:endParaRPr>
+          </a:p>
           <a:p>
             <a:pPr>
               <a:spcBef>
@@ -16341,35 +16452,19 @@
               </a:spcBef>
               <a:buSzTx/>
               <a:buNone/>
-            </a:pPr>
-            <a:r>
-              <a:t>Using the </a:t>
-            </a:r>
-            <a:r>
-              <a:rPr b="1">
+              <a:defRPr b="1" sz="2800">
                 <a:latin typeface="Courier New"/>
                 <a:ea typeface="Courier New"/>
                 <a:cs typeface="Courier New"/>
                 <a:sym typeface="Courier New"/>
-              </a:rPr>
-              <a:t>and</a:t>
-            </a:r>
-            <a:r>
-              <a:t> keyword, </a:t>
-            </a:r>
-            <a:r>
-              <a:rPr u="sng"/>
-              <a:t>both</a:t>
-            </a:r>
-            <a:r>
-              <a:t> conditions must be true for the print statement at line 7 to run.</a:t>
-            </a:r>
-          </a:p>
-        </p:txBody>
-      </p:sp>
-      <p:sp>
-        <p:nvSpPr>
-          <p:cNvPr id="343" name="Slide Number"/>
+              </a:defRPr>
+            </a:pPr>
+          </a:p>
+        </p:txBody>
+      </p:sp>
+      <p:sp>
+        <p:nvSpPr>
+          <p:cNvPr id="345" name="Slide Number"/>
           <p:cNvSpPr txBox="1"/>
           <p:nvPr>
             <p:ph type="sldNum" sz="quarter" idx="2"/>
@@ -16400,7 +16495,7 @@
       </p:sp>
       <p:sp>
         <p:nvSpPr>
-          <p:cNvPr id="344" name="compound cONDITIONALS"/>
+          <p:cNvPr id="346" name="complex cONDITIONALS"/>
           <p:cNvSpPr/>
           <p:nvPr/>
         </p:nvSpPr>
@@ -16446,14 +16541,14 @@
           <a:p>
             <a:pPr/>
             <a:r>
-              <a:t>compound cONDITIONALS</a:t>
+              <a:t>complex cONDITIONALS</a:t>
             </a:r>
           </a:p>
         </p:txBody>
       </p:sp>
       <p:pic>
         <p:nvPicPr>
-          <p:cNvPr id="345" name="conditionals_1.png" descr="conditionals_1.png"/>
+          <p:cNvPr id="347" name="hmc_complex_conditionals.png" descr="hmc_complex_conditionals.png"/>
           <p:cNvPicPr>
             <a:picLocks noChangeAspect="1"/>
           </p:cNvPicPr>
@@ -16463,15 +16558,14 @@
           <a:blip r:embed="rId2">
             <a:extLst/>
           </a:blip>
-          <a:srcRect l="576" t="0" r="576" b="0"/>
           <a:stretch>
             <a:fillRect/>
           </a:stretch>
         </p:blipFill>
         <p:spPr>
           <a:xfrm>
-            <a:off x="-7621" y="3111792"/>
-            <a:ext cx="9144001" cy="2667410"/>
+            <a:off x="220979" y="3092559"/>
+            <a:ext cx="8686801" cy="2298701"/>
           </a:xfrm>
           <a:prstGeom prst="rect">
             <a:avLst/>
@@ -16509,7 +16603,7 @@
       </p:grpSpPr>
       <p:sp>
         <p:nvSpPr>
-          <p:cNvPr id="347" name="Using the or keyword, either condition could be true for the print statement at line 2 to run."/>
+          <p:cNvPr id="349" name="Using the and keyword, both conditions must be true for the print statement at line 7 to run."/>
           <p:cNvSpPr txBox="1"/>
           <p:nvPr>
             <p:ph type="body" idx="1"/>
@@ -16547,24 +16641,24 @@
                 <a:cs typeface="Courier New"/>
                 <a:sym typeface="Courier New"/>
               </a:rPr>
-              <a:t>or</a:t>
+              <a:t>and</a:t>
             </a:r>
             <a:r>
               <a:t> keyword, </a:t>
             </a:r>
             <a:r>
               <a:rPr u="sng"/>
-              <a:t>either</a:t>
-            </a:r>
-            <a:r>
-              <a:t> condition could be true for the print statement at line 2 to run.</a:t>
-            </a:r>
-          </a:p>
-        </p:txBody>
-      </p:sp>
-      <p:sp>
-        <p:nvSpPr>
-          <p:cNvPr id="348" name="Slide Number"/>
+              <a:t>both</a:t>
+            </a:r>
+            <a:r>
+              <a:t> conditions must be true for the print statement at line 7 to run.</a:t>
+            </a:r>
+          </a:p>
+        </p:txBody>
+      </p:sp>
+      <p:sp>
+        <p:nvSpPr>
+          <p:cNvPr id="350" name="Slide Number"/>
           <p:cNvSpPr txBox="1"/>
           <p:nvPr>
             <p:ph type="sldNum" sz="quarter" idx="2"/>
@@ -16595,7 +16689,7 @@
       </p:sp>
       <p:sp>
         <p:nvSpPr>
-          <p:cNvPr id="349" name="compound cONDITIONALS"/>
+          <p:cNvPr id="351" name="compound cONDITIONALS"/>
           <p:cNvSpPr/>
           <p:nvPr/>
         </p:nvSpPr>
@@ -16648,7 +16742,7 @@
       </p:sp>
       <p:pic>
         <p:nvPicPr>
-          <p:cNvPr id="350" name="hmc_if-or.png" descr="hmc_if-or.png"/>
+          <p:cNvPr id="352" name="conditionals_1.png" descr="conditionals_1.png"/>
           <p:cNvPicPr>
             <a:picLocks noChangeAspect="1"/>
           </p:cNvPicPr>
@@ -16658,14 +16752,15 @@
           <a:blip r:embed="rId2">
             <a:extLst/>
           </a:blip>
+          <a:srcRect l="576" t="0" r="576" b="0"/>
           <a:stretch>
             <a:fillRect/>
           </a:stretch>
         </p:blipFill>
         <p:spPr>
           <a:xfrm>
-            <a:off x="159628" y="3094461"/>
-            <a:ext cx="8809504" cy="669078"/>
+            <a:off x="-7621" y="3111792"/>
+            <a:ext cx="9144001" cy="2667410"/>
           </a:xfrm>
           <a:prstGeom prst="rect">
             <a:avLst/>
@@ -16703,7 +16798,62 @@
       </p:grpSpPr>
       <p:sp>
         <p:nvSpPr>
-          <p:cNvPr id="352" name="Slide Number"/>
+          <p:cNvPr id="354" name="Using the or keyword, either condition could be true for the print statement at line 2 to run."/>
+          <p:cNvSpPr txBox="1"/>
+          <p:nvPr>
+            <p:ph type="body" idx="1"/>
+          </p:nvPr>
+        </p:nvSpPr>
+        <p:spPr>
+          <a:xfrm>
+            <a:off x="441959" y="1354655"/>
+            <a:ext cx="8244842" cy="4924225"/>
+          </a:xfrm>
+          <a:prstGeom prst="rect">
+            <a:avLst/>
+          </a:prstGeom>
+        </p:spPr>
+        <p:txBody>
+          <a:bodyPr>
+            <a:normAutofit fontScale="100000" lnSpcReduction="0"/>
+          </a:bodyPr>
+          <a:lstStyle/>
+          <a:p>
+            <a:pPr>
+              <a:spcBef>
+                <a:spcPts val="600"/>
+              </a:spcBef>
+              <a:buSzTx/>
+              <a:buNone/>
+            </a:pPr>
+            <a:r>
+              <a:t>Using the </a:t>
+            </a:r>
+            <a:r>
+              <a:rPr b="1">
+                <a:latin typeface="Courier New"/>
+                <a:ea typeface="Courier New"/>
+                <a:cs typeface="Courier New"/>
+                <a:sym typeface="Courier New"/>
+              </a:rPr>
+              <a:t>or</a:t>
+            </a:r>
+            <a:r>
+              <a:t> keyword, </a:t>
+            </a:r>
+            <a:r>
+              <a:rPr u="sng"/>
+              <a:t>either</a:t>
+            </a:r>
+            <a:r>
+              <a:t> condition could be true for the print statement at line 2 to run.</a:t>
+            </a:r>
+          </a:p>
+        </p:txBody>
+      </p:sp>
+      <p:sp>
+        <p:nvSpPr>
+          <p:cNvPr id="355" name="Slide Number"/>
           <p:cNvSpPr txBox="1"/>
           <p:nvPr>
             <p:ph type="sldNum" sz="quarter" idx="2"/>
@@ -16734,7 +16884,7 @@
       </p:sp>
       <p:sp>
         <p:nvSpPr>
-          <p:cNvPr id="353" name="nested cONDITIONALS"/>
+          <p:cNvPr id="356" name="compound cONDITIONALS"/>
           <p:cNvSpPr/>
           <p:nvPr/>
         </p:nvSpPr>
@@ -16780,21 +16930,21 @@
           <a:p>
             <a:pPr/>
             <a:r>
-              <a:t>nested cONDITIONALS</a:t>
+              <a:t>compound cONDITIONALS</a:t>
             </a:r>
           </a:p>
         </p:txBody>
       </p:sp>
       <p:pic>
         <p:nvPicPr>
-          <p:cNvPr id="354" name="hmc_nested_conditionals.png" descr="hmc_nested_conditionals.png"/>
+          <p:cNvPr id="357" name="hmc_if-or.png" descr="hmc_if-or.png"/>
           <p:cNvPicPr>
             <a:picLocks noChangeAspect="1"/>
           </p:cNvPicPr>
           <p:nvPr/>
         </p:nvPicPr>
         <p:blipFill>
-          <a:blip r:embed="rId3">
+          <a:blip r:embed="rId2">
             <a:extLst/>
           </a:blip>
           <a:stretch>
@@ -16803,8 +16953,8 @@
         </p:blipFill>
         <p:spPr>
           <a:xfrm>
-            <a:off x="326312" y="1217851"/>
-            <a:ext cx="8491376" cy="4422298"/>
+            <a:off x="159628" y="3094461"/>
+            <a:ext cx="8809504" cy="669078"/>
           </a:xfrm>
           <a:prstGeom prst="rect">
             <a:avLst/>
@@ -16842,7 +16992,146 @@
       </p:grpSpPr>
       <p:sp>
         <p:nvSpPr>
-          <p:cNvPr id="358" name="Head to Hear Me Code's Slides on Github, which has examples &amp; code samples for the lesson.…"/>
+          <p:cNvPr id="359" name="Slide Number"/>
+          <p:cNvSpPr txBox="1"/>
+          <p:nvPr>
+            <p:ph type="sldNum" sz="quarter" idx="2"/>
+          </p:nvPr>
+        </p:nvSpPr>
+        <p:spPr>
+          <a:xfrm>
+            <a:off x="5791200" y="6419053"/>
+            <a:ext cx="2133600" cy="368301"/>
+          </a:xfrm>
+          <a:prstGeom prst="rect">
+            <a:avLst/>
+          </a:prstGeom>
+          <a:extLst>
+            <a:ext uri="{C572A759-6A51-4108-AA02-DFA0A04FC94B}">
+              <ma14:wrappingTextBoxFlag xmlns:ma14="http://schemas.microsoft.com/office/mac/drawingml/2011/main" val="1"/>
+            </a:ext>
+          </a:extLst>
+        </p:spPr>
+        <p:txBody>
+          <a:bodyPr/>
+          <a:lstStyle/>
+          <a:p>
+            <a:pPr/>
+            <a:fld id="{86CB4B4D-7CA3-9044-876B-883B54F8677D}" type="slidenum"/>
+          </a:p>
+        </p:txBody>
+      </p:sp>
+      <p:sp>
+        <p:nvSpPr>
+          <p:cNvPr id="360" name="nested cONDITIONALS"/>
+          <p:cNvSpPr/>
+          <p:nvPr/>
+        </p:nvSpPr>
+        <p:spPr>
+          <a:xfrm>
+            <a:off x="0" y="206107"/>
+            <a:ext cx="8686800" cy="812483"/>
+          </a:xfrm>
+          <a:prstGeom prst="rect">
+            <a:avLst/>
+          </a:prstGeom>
+          <a:solidFill>
+            <a:srgbClr val="FFFFFF">
+              <a:alpha val="70000"/>
+            </a:srgbClr>
+          </a:solidFill>
+          <a:ln w="12700">
+            <a:miter lim="400000"/>
+          </a:ln>
+          <a:extLst>
+            <a:ext uri="{C572A759-6A51-4108-AA02-DFA0A04FC94B}">
+              <ma14:wrappingTextBoxFlag xmlns:ma14="http://schemas.microsoft.com/office/mac/drawingml/2011/main" val="1"/>
+            </a:ext>
+          </a:extLst>
+        </p:spPr>
+        <p:txBody>
+          <a:bodyPr tIns="91439" bIns="91439" anchor="ctr">
+            <a:normAutofit fontScale="100000" lnSpcReduction="0"/>
+          </a:bodyPr>
+          <a:lstStyle>
+            <a:lvl1pPr>
+              <a:spcBef>
+                <a:spcPts val="900"/>
+              </a:spcBef>
+              <a:defRPr cap="all" sz="4000">
+                <a:latin typeface="+mn-lt"/>
+                <a:ea typeface="+mn-ea"/>
+                <a:cs typeface="+mn-cs"/>
+                <a:sym typeface="Century Gothic"/>
+              </a:defRPr>
+            </a:lvl1pPr>
+          </a:lstStyle>
+          <a:p>
+            <a:pPr/>
+            <a:r>
+              <a:t>nested cONDITIONALS</a:t>
+            </a:r>
+          </a:p>
+        </p:txBody>
+      </p:sp>
+      <p:pic>
+        <p:nvPicPr>
+          <p:cNvPr id="361" name="hmc_nested_conditionals.png" descr="hmc_nested_conditionals.png"/>
+          <p:cNvPicPr>
+            <a:picLocks noChangeAspect="1"/>
+          </p:cNvPicPr>
+          <p:nvPr/>
+        </p:nvPicPr>
+        <p:blipFill>
+          <a:blip r:embed="rId3">
+            <a:extLst/>
+          </a:blip>
+          <a:stretch>
+            <a:fillRect/>
+          </a:stretch>
+        </p:blipFill>
+        <p:spPr>
+          <a:xfrm>
+            <a:off x="326312" y="1217851"/>
+            <a:ext cx="8491376" cy="4422298"/>
+          </a:xfrm>
+          <a:prstGeom prst="rect">
+            <a:avLst/>
+          </a:prstGeom>
+          <a:ln w="12700">
+            <a:miter lim="400000"/>
+          </a:ln>
+        </p:spPr>
+      </p:pic>
+    </p:spTree>
+  </p:cSld>
+  <p:clrMapOvr>
+    <a:masterClrMapping/>
+  </p:clrMapOvr>
+  <p:transition xmlns:p14="http://schemas.microsoft.com/office/powerpoint/2010/main" spd="med" advClick="1"/>
+</p:sld>
+</file>
+
+<file path=ppt/slides/slide56.xml><?xml version="1.0" encoding="utf-8"?>
+<p:sld xmlns:a="http://schemas.openxmlformats.org/drawingml/2006/main" xmlns:r="http://schemas.openxmlformats.org/officeDocument/2006/relationships" xmlns:p="http://schemas.openxmlformats.org/presentationml/2006/main" showMasterSp="1" showMasterPhAnim="1">
+  <p:cSld>
+    <p:spTree>
+      <p:nvGrpSpPr>
+        <p:cNvPr id="1" name=""/>
+        <p:cNvGrpSpPr/>
+        <p:nvPr/>
+      </p:nvGrpSpPr>
+      <p:grpSpPr>
+        <a:xfrm>
+          <a:off x="0" y="0"/>
+          <a:ext cx="0" cy="0"/>
+          <a:chOff x="0" y="0"/>
+          <a:chExt cx="0" cy="0"/>
+        </a:xfrm>
+      </p:grpSpPr>
+      <p:sp>
+        <p:nvSpPr>
+          <p:cNvPr id="365" name="Head to Hear Me Code's Slides on Github, which has examples &amp; code samples for the lesson.…"/>
           <p:cNvSpPr txBox="1"/>
           <p:nvPr>
             <p:ph type="body" idx="1"/>
@@ -16956,7 +17245,7 @@
       </p:sp>
       <p:sp>
         <p:nvSpPr>
-          <p:cNvPr id="359" name="Slide Number"/>
+          <p:cNvPr id="366" name="Slide Number"/>
           <p:cNvSpPr txBox="1"/>
           <p:nvPr>
             <p:ph type="sldNum" sz="quarter" idx="2"/>
@@ -16987,7 +17276,7 @@
       </p:sp>
       <p:sp>
         <p:nvSpPr>
-          <p:cNvPr id="360" name="Playtime!"/>
+          <p:cNvPr id="367" name="Playtime!"/>
           <p:cNvSpPr/>
           <p:nvPr/>
         </p:nvSpPr>

</xml_diff>

<commit_message>
Added demos to the end of the lesson 1 and lesson 2 slides
</commit_message>
<xml_diff>
--- a/Lesson 1/Hear Me Code - Strings and Conditionals.pptx
+++ b/Lesson 1/Hear Me Code - Strings and Conditionals.pptx
@@ -64,6 +64,7 @@
     <p:sldId id="309" r:id="rId61"/>
     <p:sldId id="310" r:id="rId62"/>
     <p:sldId id="311" r:id="rId63"/>
+    <p:sldId id="312" r:id="rId64"/>
   </p:sldIdLst>
   <p:sldSz cx="9144000" cy="6858000"/>
   <p:notesSz cx="6858000" cy="9144000"/>
@@ -2920,6 +2921,88 @@
       <p:sp>
         <p:nvSpPr>
           <p:cNvPr id="369" name="Shape 369"/>
+          <p:cNvSpPr/>
+          <p:nvPr>
+            <p:ph type="body" sz="quarter" idx="1"/>
+          </p:nvPr>
+        </p:nvSpPr>
+        <p:spPr>
+          <a:prstGeom prst="rect">
+            <a:avLst/>
+          </a:prstGeom>
+        </p:spPr>
+        <p:txBody>
+          <a:bodyPr/>
+          <a:lstStyle/>
+          <a:p>
+            <a:pPr/>
+            <a:r>
+              <a:t>If there are other vetted demos from teaching assistants, this is a good time for them. Keep them short. If there are no other demos, just do these two.</a:t>
+            </a:r>
+          </a:p>
+          <a:p>
+            <a:pPr/>
+            <a:r>
+              <a:t>If Suellen is there, have her demo and explain her social security example.</a:t>
+            </a:r>
+          </a:p>
+          <a:p>
+            <a:pPr/>
+            <a:r>
+              <a:t>If Shannon is there, have her demo and explain her Bechdel test website.</a:t>
+            </a:r>
+          </a:p>
+        </p:txBody>
+      </p:sp>
+    </p:spTree>
+  </p:cSld>
+  <p:clrMapOvr>
+    <a:masterClrMapping/>
+  </p:clrMapOvr>
+</p:notes>
+</file>
+
+<file path=ppt/notesSlides/notesSlide37.xml><?xml version="1.0" encoding="utf-8"?>
+<p:notes xmlns:a="http://schemas.openxmlformats.org/drawingml/2006/main" xmlns:r="http://schemas.openxmlformats.org/officeDocument/2006/relationships" xmlns:p="http://schemas.openxmlformats.org/presentationml/2006/main" showMasterSp="1" showMasterPhAnim="1">
+  <p:cSld>
+    <p:spTree>
+      <p:nvGrpSpPr>
+        <p:cNvPr id="1" name=""/>
+        <p:cNvGrpSpPr/>
+        <p:nvPr/>
+      </p:nvGrpSpPr>
+      <p:grpSpPr>
+        <a:xfrm>
+          <a:off x="0" y="0"/>
+          <a:ext cx="0" cy="0"/>
+          <a:chOff x="0" y="0"/>
+          <a:chExt cx="0" cy="0"/>
+        </a:xfrm>
+      </p:grpSpPr>
+      <p:sp>
+        <p:nvSpPr>
+          <p:cNvPr id="374" name="Shape 374"/>
+          <p:cNvSpPr/>
+          <p:nvPr>
+            <p:ph type="sldImg"/>
+          </p:nvPr>
+        </p:nvSpPr>
+        <p:spPr>
+          <a:prstGeom prst="rect">
+            <a:avLst/>
+          </a:prstGeom>
+        </p:spPr>
+        <p:txBody>
+          <a:bodyPr/>
+          <a:lstStyle/>
+          <a:p>
+            <a:pPr/>
+          </a:p>
+        </p:txBody>
+      </p:sp>
+      <p:sp>
+        <p:nvSpPr>
+          <p:cNvPr id="375" name="Shape 375"/>
           <p:cNvSpPr/>
           <p:nvPr>
             <p:ph type="body" sz="quarter" idx="1"/>
@@ -17131,7 +17214,204 @@
       </p:grpSpPr>
       <p:sp>
         <p:nvSpPr>
-          <p:cNvPr id="365" name="Head to Hear Me Code's Slides on Github, which has examples &amp; code samples for the lesson.…"/>
+          <p:cNvPr id="365" name="You'll use strings and conditionals in every Python program you write.…"/>
+          <p:cNvSpPr txBox="1"/>
+          <p:nvPr>
+            <p:ph type="body" idx="1"/>
+          </p:nvPr>
+        </p:nvSpPr>
+        <p:spPr>
+          <a:prstGeom prst="rect">
+            <a:avLst/>
+          </a:prstGeom>
+        </p:spPr>
+        <p:txBody>
+          <a:bodyPr>
+            <a:normAutofit fontScale="100000" lnSpcReduction="0"/>
+          </a:bodyPr>
+          <a:lstStyle/>
+          <a:p>
+            <a:pPr>
+              <a:buSzTx/>
+              <a:buNone/>
+            </a:pPr>
+            <a:r>
+              <a:t>You'll use strings and conditionals in every Python program you write.</a:t>
+            </a:r>
+          </a:p>
+          <a:p>
+            <a:pPr>
+              <a:buSzTx/>
+              <a:buNone/>
+            </a:pPr>
+          </a:p>
+          <a:p>
+            <a:pPr>
+              <a:buSzTx/>
+              <a:buNone/>
+            </a:pPr>
+            <a:r>
+              <a:t>Here are a few examples:</a:t>
+            </a:r>
+          </a:p>
+          <a:p>
+            <a:pPr marL="320842" indent="-320842">
+              <a:buFontTx/>
+            </a:pPr>
+          </a:p>
+          <a:p>
+            <a:pPr marL="320842" indent="-320842">
+              <a:buFontTx/>
+            </a:pPr>
+            <a:r>
+              <a:rPr u="sng">
+                <a:solidFill>
+                  <a:srgbClr val="0000FF"/>
+                </a:solidFill>
+                <a:uFill>
+                  <a:solidFill>
+                    <a:srgbClr val="0000FF"/>
+                  </a:solidFill>
+                </a:uFill>
+                <a:hlinkClick r:id="rId3" invalidUrl="" action="" tgtFrame="" tooltip="" history="1" highlightClick="0" endSnd="0"/>
+              </a:rPr>
+              <a:t>Verify a social security number is valid</a:t>
+            </a:r>
+          </a:p>
+          <a:p>
+            <a:pPr marL="320842" indent="-320842">
+              <a:buFontTx/>
+            </a:pPr>
+            <a:r>
+              <a:rPr u="sng">
+                <a:solidFill>
+                  <a:srgbClr val="0000FF"/>
+                </a:solidFill>
+                <a:uFill>
+                  <a:solidFill>
+                    <a:srgbClr val="0000FF"/>
+                  </a:solidFill>
+                </a:uFill>
+                <a:hlinkClick r:id="rId4" invalidUrl="" action="" tgtFrame="" tooltip="" history="1" highlightClick="0" endSnd="0"/>
+              </a:rPr>
+              <a:t>Edit a search to improve the results returned</a:t>
+            </a:r>
+          </a:p>
+        </p:txBody>
+      </p:sp>
+      <p:sp>
+        <p:nvSpPr>
+          <p:cNvPr id="366" name="Slide Number"/>
+          <p:cNvSpPr txBox="1"/>
+          <p:nvPr>
+            <p:ph type="sldNum" sz="quarter" idx="2"/>
+          </p:nvPr>
+        </p:nvSpPr>
+        <p:spPr>
+          <a:xfrm>
+            <a:off x="5791200" y="6419053"/>
+            <a:ext cx="2133600" cy="368301"/>
+          </a:xfrm>
+          <a:prstGeom prst="rect">
+            <a:avLst/>
+          </a:prstGeom>
+          <a:extLst>
+            <a:ext uri="{C572A759-6A51-4108-AA02-DFA0A04FC94B}">
+              <ma14:wrappingTextBoxFlag xmlns:ma14="http://schemas.microsoft.com/office/mac/drawingml/2011/main" val="1"/>
+            </a:ext>
+          </a:extLst>
+        </p:spPr>
+        <p:txBody>
+          <a:bodyPr/>
+          <a:lstStyle/>
+          <a:p>
+            <a:pPr/>
+            <a:fld id="{86CB4B4D-7CA3-9044-876B-883B54F8677D}" type="slidenum"/>
+          </a:p>
+        </p:txBody>
+      </p:sp>
+      <p:sp>
+        <p:nvSpPr>
+          <p:cNvPr id="367" name="What can I do with python, though?"/>
+          <p:cNvSpPr/>
+          <p:nvPr/>
+        </p:nvSpPr>
+        <p:spPr>
+          <a:xfrm>
+            <a:off x="0" y="206107"/>
+            <a:ext cx="8686800" cy="812483"/>
+          </a:xfrm>
+          <a:prstGeom prst="rect">
+            <a:avLst/>
+          </a:prstGeom>
+          <a:solidFill>
+            <a:srgbClr val="FFFFFF">
+              <a:alpha val="70000"/>
+            </a:srgbClr>
+          </a:solidFill>
+          <a:ln w="12700">
+            <a:miter lim="400000"/>
+          </a:ln>
+          <a:extLst>
+            <a:ext uri="{C572A759-6A51-4108-AA02-DFA0A04FC94B}">
+              <ma14:wrappingTextBoxFlag xmlns:ma14="http://schemas.microsoft.com/office/mac/drawingml/2011/main" val="1"/>
+            </a:ext>
+          </a:extLst>
+        </p:spPr>
+        <p:txBody>
+          <a:bodyPr tIns="91439" bIns="91439" anchor="ctr">
+            <a:normAutofit fontScale="100000" lnSpcReduction="0"/>
+          </a:bodyPr>
+          <a:lstStyle>
+            <a:lvl1pPr defTabSz="384047">
+              <a:spcBef>
+                <a:spcPts val="800"/>
+              </a:spcBef>
+              <a:defRPr cap="all" sz="3359">
+                <a:latin typeface="+mn-lt"/>
+                <a:ea typeface="+mn-ea"/>
+                <a:cs typeface="+mn-cs"/>
+                <a:sym typeface="Century Gothic"/>
+              </a:defRPr>
+            </a:lvl1pPr>
+          </a:lstStyle>
+          <a:p>
+            <a:pPr/>
+            <a:r>
+              <a:t>What can I do with python, though?</a:t>
+            </a:r>
+          </a:p>
+        </p:txBody>
+      </p:sp>
+    </p:spTree>
+  </p:cSld>
+  <p:clrMapOvr>
+    <a:masterClrMapping/>
+  </p:clrMapOvr>
+  <p:transition xmlns:p14="http://schemas.microsoft.com/office/powerpoint/2010/main" spd="med" advClick="1"/>
+</p:sld>
+</file>
+
+<file path=ppt/slides/slide57.xml><?xml version="1.0" encoding="utf-8"?>
+<p:sld xmlns:a="http://schemas.openxmlformats.org/drawingml/2006/main" xmlns:r="http://schemas.openxmlformats.org/officeDocument/2006/relationships" xmlns:p="http://schemas.openxmlformats.org/presentationml/2006/main" showMasterSp="1" showMasterPhAnim="1">
+  <p:cSld>
+    <p:spTree>
+      <p:nvGrpSpPr>
+        <p:cNvPr id="1" name=""/>
+        <p:cNvGrpSpPr/>
+        <p:nvPr/>
+      </p:nvGrpSpPr>
+      <p:grpSpPr>
+        <a:xfrm>
+          <a:off x="0" y="0"/>
+          <a:ext cx="0" cy="0"/>
+          <a:chOff x="0" y="0"/>
+          <a:chExt cx="0" cy="0"/>
+        </a:xfrm>
+      </p:grpSpPr>
+      <p:sp>
+        <p:nvSpPr>
+          <p:cNvPr id="371" name="Head to Hear Me Code's Slides on Github, which has examples &amp; code samples for the lesson.…"/>
           <p:cNvSpPr txBox="1"/>
           <p:nvPr>
             <p:ph type="body" idx="1"/>
@@ -17245,7 +17525,7 @@
       </p:sp>
       <p:sp>
         <p:nvSpPr>
-          <p:cNvPr id="366" name="Slide Number"/>
+          <p:cNvPr id="372" name="Slide Number"/>
           <p:cNvSpPr txBox="1"/>
           <p:nvPr>
             <p:ph type="sldNum" sz="quarter" idx="2"/>
@@ -17276,7 +17556,7 @@
       </p:sp>
       <p:sp>
         <p:nvSpPr>
-          <p:cNvPr id="367" name="Playtime!"/>
+          <p:cNvPr id="373" name="Playtime!"/>
           <p:cNvSpPr/>
           <p:nvPr/>
         </p:nvSpPr>

</xml_diff>